<commit_message>
amadeus and cuong proposed weights
</commit_message>
<xml_diff>
--- a/20190811FGAN.pptx
+++ b/20190811FGAN.pptx
@@ -268,7 +268,7 @@
           <a:p>
             <a:fld id="{E5C6EFBF-39B1-D74C-A928-C764556F071E}" type="datetimeFigureOut">
               <a:rPr lang="en-US" smtClean="0"/>
-              <a:t>8/11/19</a:t>
+              <a:t>8/12/19</a:t>
             </a:fld>
             <a:endParaRPr lang="en-US"/>
           </a:p>
@@ -466,7 +466,7 @@
           <a:p>
             <a:fld id="{E5C6EFBF-39B1-D74C-A928-C764556F071E}" type="datetimeFigureOut">
               <a:rPr lang="en-US" smtClean="0"/>
-              <a:t>8/11/19</a:t>
+              <a:t>8/12/19</a:t>
             </a:fld>
             <a:endParaRPr lang="en-US"/>
           </a:p>
@@ -674,7 +674,7 @@
           <a:p>
             <a:fld id="{E5C6EFBF-39B1-D74C-A928-C764556F071E}" type="datetimeFigureOut">
               <a:rPr lang="en-US" smtClean="0"/>
-              <a:t>8/11/19</a:t>
+              <a:t>8/12/19</a:t>
             </a:fld>
             <a:endParaRPr lang="en-US"/>
           </a:p>
@@ -872,7 +872,7 @@
           <a:p>
             <a:fld id="{E5C6EFBF-39B1-D74C-A928-C764556F071E}" type="datetimeFigureOut">
               <a:rPr lang="en-US" smtClean="0"/>
-              <a:t>8/11/19</a:t>
+              <a:t>8/12/19</a:t>
             </a:fld>
             <a:endParaRPr lang="en-US"/>
           </a:p>
@@ -1147,7 +1147,7 @@
           <a:p>
             <a:fld id="{E5C6EFBF-39B1-D74C-A928-C764556F071E}" type="datetimeFigureOut">
               <a:rPr lang="en-US" smtClean="0"/>
-              <a:t>8/11/19</a:t>
+              <a:t>8/12/19</a:t>
             </a:fld>
             <a:endParaRPr lang="en-US"/>
           </a:p>
@@ -1412,7 +1412,7 @@
           <a:p>
             <a:fld id="{E5C6EFBF-39B1-D74C-A928-C764556F071E}" type="datetimeFigureOut">
               <a:rPr lang="en-US" smtClean="0"/>
-              <a:t>8/11/19</a:t>
+              <a:t>8/12/19</a:t>
             </a:fld>
             <a:endParaRPr lang="en-US"/>
           </a:p>
@@ -1824,7 +1824,7 @@
           <a:p>
             <a:fld id="{E5C6EFBF-39B1-D74C-A928-C764556F071E}" type="datetimeFigureOut">
               <a:rPr lang="en-US" smtClean="0"/>
-              <a:t>8/11/19</a:t>
+              <a:t>8/12/19</a:t>
             </a:fld>
             <a:endParaRPr lang="en-US"/>
           </a:p>
@@ -1965,7 +1965,7 @@
           <a:p>
             <a:fld id="{E5C6EFBF-39B1-D74C-A928-C764556F071E}" type="datetimeFigureOut">
               <a:rPr lang="en-US" smtClean="0"/>
-              <a:t>8/11/19</a:t>
+              <a:t>8/12/19</a:t>
             </a:fld>
             <a:endParaRPr lang="en-US"/>
           </a:p>
@@ -2078,7 +2078,7 @@
           <a:p>
             <a:fld id="{E5C6EFBF-39B1-D74C-A928-C764556F071E}" type="datetimeFigureOut">
               <a:rPr lang="en-US" smtClean="0"/>
-              <a:t>8/11/19</a:t>
+              <a:t>8/12/19</a:t>
             </a:fld>
             <a:endParaRPr lang="en-US"/>
           </a:p>
@@ -2389,7 +2389,7 @@
           <a:p>
             <a:fld id="{E5C6EFBF-39B1-D74C-A928-C764556F071E}" type="datetimeFigureOut">
               <a:rPr lang="en-US" smtClean="0"/>
-              <a:t>8/11/19</a:t>
+              <a:t>8/12/19</a:t>
             </a:fld>
             <a:endParaRPr lang="en-US"/>
           </a:p>
@@ -2677,7 +2677,7 @@
           <a:p>
             <a:fld id="{E5C6EFBF-39B1-D74C-A928-C764556F071E}" type="datetimeFigureOut">
               <a:rPr lang="en-US" smtClean="0"/>
-              <a:t>8/11/19</a:t>
+              <a:t>8/12/19</a:t>
             </a:fld>
             <a:endParaRPr lang="en-US"/>
           </a:p>
@@ -2918,7 +2918,7 @@
           <a:p>
             <a:fld id="{E5C6EFBF-39B1-D74C-A928-C764556F071E}" type="datetimeFigureOut">
               <a:rPr lang="en-US" smtClean="0"/>
-              <a:t>8/11/19</a:t>
+              <a:t>8/12/19</a:t>
             </a:fld>
             <a:endParaRPr lang="en-US"/>
           </a:p>
@@ -3500,7 +3500,7 @@
         </p:blipFill>
         <p:spPr>
           <a:xfrm>
-            <a:off x="838200" y="2108405"/>
+            <a:off x="838200" y="2359127"/>
             <a:ext cx="5842000" cy="4381500"/>
           </a:xfrm>
           <a:prstGeom prst="rect">
@@ -3764,10 +3764,10 @@
       </p:sp>
       <p:pic>
         <p:nvPicPr>
-          <p:cNvPr id="10" name="Picture 9">
-            <a:extLst>
-              <a:ext uri="{FF2B5EF4-FFF2-40B4-BE49-F238E27FC236}">
-                <a16:creationId xmlns:a16="http://schemas.microsoft.com/office/drawing/2014/main" id="{6B4D0776-F835-794B-938B-266BE63409E2}"/>
+          <p:cNvPr id="7" name="Picture 6">
+            <a:extLst>
+              <a:ext uri="{FF2B5EF4-FFF2-40B4-BE49-F238E27FC236}">
+                <a16:creationId xmlns:a16="http://schemas.microsoft.com/office/drawing/2014/main" id="{8DACE042-9BC0-8E48-AA95-50312F794625}"/>
               </a:ext>
             </a:extLst>
           </p:cNvPr>
@@ -3784,8 +3784,8 @@
         </p:blipFill>
         <p:spPr>
           <a:xfrm>
-            <a:off x="1407857" y="2689817"/>
-            <a:ext cx="6515100" cy="2095500"/>
+            <a:off x="1662266" y="2623344"/>
+            <a:ext cx="6743700" cy="2755900"/>
           </a:xfrm>
           <a:prstGeom prst="rect">
             <a:avLst/>
@@ -3889,10 +3889,10 @@
       </p:sp>
       <p:pic>
         <p:nvPicPr>
-          <p:cNvPr id="8" name="Picture 7">
-            <a:extLst>
-              <a:ext uri="{FF2B5EF4-FFF2-40B4-BE49-F238E27FC236}">
-                <a16:creationId xmlns:a16="http://schemas.microsoft.com/office/drawing/2014/main" id="{04F81259-6BDA-D54F-8DEE-2949962BF40E}"/>
+          <p:cNvPr id="5" name="Picture 4">
+            <a:extLst>
+              <a:ext uri="{FF2B5EF4-FFF2-40B4-BE49-F238E27FC236}">
+                <a16:creationId xmlns:a16="http://schemas.microsoft.com/office/drawing/2014/main" id="{6121A8E4-8EAA-6B4D-BED2-8CD2E6C066B7}"/>
               </a:ext>
             </a:extLst>
           </p:cNvPr>
@@ -3909,8 +3909,8 @@
         </p:blipFill>
         <p:spPr>
           <a:xfrm>
-            <a:off x="1870587" y="2000455"/>
-            <a:ext cx="8039100" cy="4356100"/>
+            <a:off x="1530350" y="2559844"/>
+            <a:ext cx="9131300" cy="2882900"/>
           </a:xfrm>
           <a:prstGeom prst="rect">
             <a:avLst/>
@@ -4059,36 +4059,6 @@
           </a:p>
         </p:txBody>
       </p:sp>
-      <p:pic>
-        <p:nvPicPr>
-          <p:cNvPr id="7" name="Picture 6">
-            <a:extLst>
-              <a:ext uri="{FF2B5EF4-FFF2-40B4-BE49-F238E27FC236}">
-                <a16:creationId xmlns:a16="http://schemas.microsoft.com/office/drawing/2014/main" id="{CF043E59-E671-6341-934B-02BDA864A02D}"/>
-              </a:ext>
-            </a:extLst>
-          </p:cNvPr>
-          <p:cNvPicPr>
-            <a:picLocks noChangeAspect="1"/>
-          </p:cNvPicPr>
-          <p:nvPr/>
-        </p:nvPicPr>
-        <p:blipFill>
-          <a:blip r:embed="rId2"/>
-          <a:stretch>
-            <a:fillRect/>
-          </a:stretch>
-        </p:blipFill>
-        <p:spPr>
-          <a:xfrm>
-            <a:off x="5210277" y="1400482"/>
-            <a:ext cx="5842000" cy="4381500"/>
-          </a:xfrm>
-          <a:prstGeom prst="rect">
-            <a:avLst/>
-          </a:prstGeom>
-        </p:spPr>
-      </p:pic>
     </p:spTree>
     <p:extLst>
       <p:ext uri="{BB962C8B-B14F-4D97-AF65-F5344CB8AC3E}">
@@ -4154,19 +4124,17 @@
       </p:sp>
       <p:pic>
         <p:nvPicPr>
-          <p:cNvPr id="13" name="Content Placeholder 12">
-            <a:extLst>
-              <a:ext uri="{FF2B5EF4-FFF2-40B4-BE49-F238E27FC236}">
-                <a16:creationId xmlns:a16="http://schemas.microsoft.com/office/drawing/2014/main" id="{074D5429-A5C1-C244-8A51-3B9A32A732CA}"/>
+          <p:cNvPr id="6" name="Picture 5">
+            <a:extLst>
+              <a:ext uri="{FF2B5EF4-FFF2-40B4-BE49-F238E27FC236}">
+                <a16:creationId xmlns:a16="http://schemas.microsoft.com/office/drawing/2014/main" id="{4D00CC1E-B5CF-2E43-83C6-8B2C89F43DD4}"/>
               </a:ext>
             </a:extLst>
           </p:cNvPr>
           <p:cNvPicPr>
-            <a:picLocks noGrp="1" noChangeAspect="1"/>
+            <a:picLocks noChangeAspect="1"/>
           </p:cNvPicPr>
-          <p:nvPr>
-            <p:ph idx="1"/>
-          </p:nvPr>
+          <p:nvPr/>
         </p:nvPicPr>
         <p:blipFill>
           <a:blip r:embed="rId2"/>
@@ -4176,17 +4144,20 @@
         </p:blipFill>
         <p:spPr>
           <a:xfrm>
-            <a:off x="451908" y="1690688"/>
-            <a:ext cx="5801784" cy="4351338"/>
+            <a:off x="1006987" y="1842934"/>
+            <a:ext cx="5842000" cy="4381500"/>
           </a:xfrm>
+          <a:prstGeom prst="rect">
+            <a:avLst/>
+          </a:prstGeom>
         </p:spPr>
       </p:pic>
       <p:pic>
         <p:nvPicPr>
-          <p:cNvPr id="15" name="Picture 14">
-            <a:extLst>
-              <a:ext uri="{FF2B5EF4-FFF2-40B4-BE49-F238E27FC236}">
-                <a16:creationId xmlns:a16="http://schemas.microsoft.com/office/drawing/2014/main" id="{522BA337-061A-E347-AB7B-139AE14E14E5}"/>
+          <p:cNvPr id="8" name="Picture 7">
+            <a:extLst>
+              <a:ext uri="{FF2B5EF4-FFF2-40B4-BE49-F238E27FC236}">
+                <a16:creationId xmlns:a16="http://schemas.microsoft.com/office/drawing/2014/main" id="{EBEB5752-1567-BA46-B338-A7DE5103658D}"/>
               </a:ext>
             </a:extLst>
           </p:cNvPr>
@@ -4203,7 +4174,7 @@
         </p:blipFill>
         <p:spPr>
           <a:xfrm>
-            <a:off x="6500761" y="1474223"/>
+            <a:off x="6350000" y="1690688"/>
             <a:ext cx="5842000" cy="4381500"/>
           </a:xfrm>
           <a:prstGeom prst="rect">
@@ -4272,19 +4243,17 @@
       </p:sp>
       <p:pic>
         <p:nvPicPr>
-          <p:cNvPr id="9" name="Content Placeholder 8">
-            <a:extLst>
-              <a:ext uri="{FF2B5EF4-FFF2-40B4-BE49-F238E27FC236}">
-                <a16:creationId xmlns:a16="http://schemas.microsoft.com/office/drawing/2014/main" id="{32CC1C79-47C0-6542-8527-8EE4BB760214}"/>
+          <p:cNvPr id="6" name="Picture 5">
+            <a:extLst>
+              <a:ext uri="{FF2B5EF4-FFF2-40B4-BE49-F238E27FC236}">
+                <a16:creationId xmlns:a16="http://schemas.microsoft.com/office/drawing/2014/main" id="{650CA35C-4A09-3543-8D9D-D0CB8ECE9FB8}"/>
               </a:ext>
             </a:extLst>
           </p:cNvPr>
           <p:cNvPicPr>
-            <a:picLocks noGrp="1" noChangeAspect="1"/>
+            <a:picLocks noChangeAspect="1"/>
           </p:cNvPicPr>
-          <p:nvPr>
-            <p:ph idx="1"/>
-          </p:nvPr>
+          <p:nvPr/>
         </p:nvPicPr>
         <p:blipFill>
           <a:blip r:embed="rId2"/>
@@ -4294,17 +4263,20 @@
         </p:blipFill>
         <p:spPr>
           <a:xfrm>
-            <a:off x="6390216" y="1489638"/>
-            <a:ext cx="5801784" cy="4351338"/>
+            <a:off x="838200" y="1690688"/>
+            <a:ext cx="5842000" cy="4381500"/>
           </a:xfrm>
+          <a:prstGeom prst="rect">
+            <a:avLst/>
+          </a:prstGeom>
         </p:spPr>
       </p:pic>
       <p:pic>
         <p:nvPicPr>
-          <p:cNvPr id="11" name="Picture 10">
-            <a:extLst>
-              <a:ext uri="{FF2B5EF4-FFF2-40B4-BE49-F238E27FC236}">
-                <a16:creationId xmlns:a16="http://schemas.microsoft.com/office/drawing/2014/main" id="{E970F6DE-9232-5C43-A1B8-B48E7390E504}"/>
+          <p:cNvPr id="8" name="Picture 7">
+            <a:extLst>
+              <a:ext uri="{FF2B5EF4-FFF2-40B4-BE49-F238E27FC236}">
+                <a16:creationId xmlns:a16="http://schemas.microsoft.com/office/drawing/2014/main" id="{72EB50DA-5FBF-814E-BC1F-FA9F1AE65BE3}"/>
               </a:ext>
             </a:extLst>
           </p:cNvPr>
@@ -4321,7 +4293,7 @@
         </p:blipFill>
         <p:spPr>
           <a:xfrm>
-            <a:off x="254000" y="1459476"/>
+            <a:off x="6350000" y="1690688"/>
             <a:ext cx="5842000" cy="4381500"/>
           </a:xfrm>
           <a:prstGeom prst="rect">
@@ -4390,19 +4362,17 @@
       </p:sp>
       <p:pic>
         <p:nvPicPr>
-          <p:cNvPr id="5" name="Content Placeholder 4">
-            <a:extLst>
-              <a:ext uri="{FF2B5EF4-FFF2-40B4-BE49-F238E27FC236}">
-                <a16:creationId xmlns:a16="http://schemas.microsoft.com/office/drawing/2014/main" id="{41482AC5-884D-DB4D-A9FD-CCCA1901B266}"/>
+          <p:cNvPr id="8" name="Picture 7">
+            <a:extLst>
+              <a:ext uri="{FF2B5EF4-FFF2-40B4-BE49-F238E27FC236}">
+                <a16:creationId xmlns:a16="http://schemas.microsoft.com/office/drawing/2014/main" id="{A3DEB08F-50D5-5C47-B9F9-C2B5CA467DA0}"/>
               </a:ext>
             </a:extLst>
           </p:cNvPr>
           <p:cNvPicPr>
-            <a:picLocks noGrp="1" noChangeAspect="1"/>
+            <a:picLocks noChangeAspect="1"/>
           </p:cNvPicPr>
-          <p:nvPr>
-            <p:ph idx="1"/>
-          </p:nvPr>
+          <p:nvPr/>
         </p:nvPicPr>
         <p:blipFill>
           <a:blip r:embed="rId2"/>
@@ -4412,17 +4382,20 @@
         </p:blipFill>
         <p:spPr>
           <a:xfrm>
-            <a:off x="6390216" y="1690688"/>
-            <a:ext cx="5801784" cy="4351338"/>
+            <a:off x="5918200" y="1415232"/>
+            <a:ext cx="5842000" cy="4381500"/>
           </a:xfrm>
+          <a:prstGeom prst="rect">
+            <a:avLst/>
+          </a:prstGeom>
         </p:spPr>
       </p:pic>
       <p:pic>
         <p:nvPicPr>
-          <p:cNvPr id="7" name="Picture 6">
-            <a:extLst>
-              <a:ext uri="{FF2B5EF4-FFF2-40B4-BE49-F238E27FC236}">
-                <a16:creationId xmlns:a16="http://schemas.microsoft.com/office/drawing/2014/main" id="{5A41FEDA-38AA-3944-9F3D-52B42F7D600A}"/>
+          <p:cNvPr id="10" name="Picture 9">
+            <a:extLst>
+              <a:ext uri="{FF2B5EF4-FFF2-40B4-BE49-F238E27FC236}">
+                <a16:creationId xmlns:a16="http://schemas.microsoft.com/office/drawing/2014/main" id="{98FE6D57-99BB-0649-ACBA-3B37D9E2826E}"/>
               </a:ext>
             </a:extLst>
           </p:cNvPr>
@@ -4439,8 +4412,8 @@
         </p:blipFill>
         <p:spPr>
           <a:xfrm>
-            <a:off x="548216" y="1547965"/>
-            <a:ext cx="5842000" cy="4381500"/>
+            <a:off x="431800" y="1690687"/>
+            <a:ext cx="5619033" cy="4214275"/>
           </a:xfrm>
           <a:prstGeom prst="rect">
             <a:avLst/>

</xml_diff>